<commit_message>
Added cookies to list of technologies.
</commit_message>
<xml_diff>
--- a/BooksRUs v2.pptx
+++ b/BooksRUs v2.pptx
@@ -738,7 +738,7 @@
           <a:p>
             <a:fld id="{54CE95B1-0576-4FE2-B138-A264CA50D34C}" type="datetimeFigureOut">
               <a:rPr lang="en-US" smtClean="0"/>
-              <a:t>4/30/13</a:t>
+              <a:t>5/1/13</a:t>
             </a:fld>
             <a:endParaRPr lang="en-US"/>
           </a:p>
@@ -934,7 +934,7 @@
           <a:p>
             <a:fld id="{54CE95B1-0576-4FE2-B138-A264CA50D34C}" type="datetimeFigureOut">
               <a:rPr lang="en-US" smtClean="0"/>
-              <a:t>4/30/13</a:t>
+              <a:t>5/1/13</a:t>
             </a:fld>
             <a:endParaRPr lang="en-US"/>
           </a:p>
@@ -1119,7 +1119,7 @@
           <a:p>
             <a:fld id="{54CE95B1-0576-4FE2-B138-A264CA50D34C}" type="datetimeFigureOut">
               <a:rPr lang="en-US" smtClean="0"/>
-              <a:t>4/30/13</a:t>
+              <a:t>5/1/13</a:t>
             </a:fld>
             <a:endParaRPr lang="en-US"/>
           </a:p>
@@ -1269,7 +1269,7 @@
           <a:p>
             <a:fld id="{54CE95B1-0576-4FE2-B138-A264CA50D34C}" type="datetimeFigureOut">
               <a:rPr lang="en-US" smtClean="0"/>
-              <a:t>4/30/13</a:t>
+              <a:t>5/1/13</a:t>
             </a:fld>
             <a:endParaRPr lang="en-US"/>
           </a:p>
@@ -1524,7 +1524,7 @@
           <a:p>
             <a:fld id="{54CE95B1-0576-4FE2-B138-A264CA50D34C}" type="datetimeFigureOut">
               <a:rPr lang="en-US" smtClean="0"/>
-              <a:t>4/30/13</a:t>
+              <a:t>5/1/13</a:t>
             </a:fld>
             <a:endParaRPr lang="en-US"/>
           </a:p>
@@ -1933,7 +1933,7 @@
           <a:p>
             <a:fld id="{54CE95B1-0576-4FE2-B138-A264CA50D34C}" type="datetimeFigureOut">
               <a:rPr lang="en-US" smtClean="0"/>
-              <a:t>4/30/13</a:t>
+              <a:t>5/1/13</a:t>
             </a:fld>
             <a:endParaRPr lang="en-US"/>
           </a:p>
@@ -2379,7 +2379,7 @@
           <a:p>
             <a:fld id="{54CE95B1-0576-4FE2-B138-A264CA50D34C}" type="datetimeFigureOut">
               <a:rPr lang="en-US" smtClean="0"/>
-              <a:t>4/30/13</a:t>
+              <a:t>5/1/13</a:t>
             </a:fld>
             <a:endParaRPr lang="en-US"/>
           </a:p>
@@ -2480,7 +2480,7 @@
           <a:p>
             <a:fld id="{54CE95B1-0576-4FE2-B138-A264CA50D34C}" type="datetimeFigureOut">
               <a:rPr lang="en-US" smtClean="0"/>
-              <a:t>4/30/13</a:t>
+              <a:t>5/1/13</a:t>
             </a:fld>
             <a:endParaRPr lang="en-US"/>
           </a:p>
@@ -2601,7 +2601,7 @@
           <a:p>
             <a:fld id="{54CE95B1-0576-4FE2-B138-A264CA50D34C}" type="datetimeFigureOut">
               <a:rPr lang="en-US" smtClean="0"/>
-              <a:t>4/30/13</a:t>
+              <a:t>5/1/13</a:t>
             </a:fld>
             <a:endParaRPr lang="en-US"/>
           </a:p>
@@ -2875,7 +2875,7 @@
           <a:p>
             <a:fld id="{54CE95B1-0576-4FE2-B138-A264CA50D34C}" type="datetimeFigureOut">
               <a:rPr lang="en-US" smtClean="0"/>
-              <a:t>4/30/13</a:t>
+              <a:t>5/1/13</a:t>
             </a:fld>
             <a:endParaRPr lang="en-US"/>
           </a:p>
@@ -3080,7 +3080,7 @@
           <a:p>
             <a:fld id="{54CE95B1-0576-4FE2-B138-A264CA50D34C}" type="datetimeFigureOut">
               <a:rPr lang="en-US" smtClean="0"/>
-              <a:t>4/30/13</a:t>
+              <a:t>5/1/13</a:t>
             </a:fld>
             <a:endParaRPr lang="en-US"/>
           </a:p>
@@ -4189,7 +4189,7 @@
           <a:p>
             <a:fld id="{54CE95B1-0576-4FE2-B138-A264CA50D34C}" type="datetimeFigureOut">
               <a:rPr lang="en-US" smtClean="0"/>
-              <a:t>4/30/13</a:t>
+              <a:t>5/1/13</a:t>
             </a:fld>
             <a:endParaRPr lang="en-US"/>
           </a:p>
@@ -5186,8 +5186,19 @@
           <a:p>
             <a:r>
               <a:rPr lang="en-US" dirty="0"/>
-              <a:t>Tomcat Container Managed Security</a:t>
-            </a:r>
+              <a:t>Tomcat Container Managed </a:t>
+            </a:r>
+            <a:r>
+              <a:rPr lang="en-US" dirty="0" smtClean="0"/>
+              <a:t>Security</a:t>
+            </a:r>
+          </a:p>
+          <a:p>
+            <a:r>
+              <a:rPr lang="en-US" dirty="0" smtClean="0"/>
+              <a:t>Cookies</a:t>
+            </a:r>
+            <a:endParaRPr lang="en-US" dirty="0"/>
           </a:p>
           <a:p>
             <a:endParaRPr lang="en-US" dirty="0"/>

</xml_diff>